<commit_message>
Added NSF grant information
Updated slide deck with NSF grant information

Signed-off-by: Andre de Waal <andre.dewaal@ibm.com>
</commit_message>
<xml_diff>
--- a/opends4all-resources/opends4all-data-and-knowledge-modeling/DATA-TYPES-intro.pptx
+++ b/opends4all-resources/opends4all-data-and-knowledge-modeling/DATA-TYPES-intro.pptx
@@ -256,7 +256,7 @@
       </p15:notesGuideLst>
     </p:ext>
     <p:ext uri="http://customooxmlschemas.google.com/">
-      <go:slidesCustomData xmlns="" xmlns:p15="http://schemas.microsoft.com/office/powerpoint/2012/main" xmlns:go="http://customooxmlschemas.google.com/" roundtripDataSignature="AMtx7mhW+JFCNcOhfESUAh1OuuX/vq4hkw==" r:id="rId70"/>
+      <go:slidesCustomData xmlns:go="http://customooxmlschemas.google.com/" xmlns:p15="http://schemas.microsoft.com/office/powerpoint/2012/main" xmlns="" roundtripDataSignature="AMtx7mhW+JFCNcOhfESUAh1OuuX/vq4hkw==" r:id="rId70"/>
     </p:ext>
   </p:extLst>
 </p:presentation>
@@ -1562,14 +1562,14 @@
           <a:ln/>
           <a:extLst>
             <a:ext uri="{909E8E84-426E-40dd-AFC4-6F175D3DCCD1}">
-              <a14:hiddenFill xmlns="" xmlns:a14="http://schemas.microsoft.com/office/drawing/2010/main">
+              <a14:hiddenFill xmlns:a14="http://schemas.microsoft.com/office/drawing/2010/main" xmlns="">
                 <a:solidFill>
                   <a:srgbClr val="FFFFFF"/>
                 </a:solidFill>
               </a14:hiddenFill>
             </a:ext>
             <a:ext uri="{91240B29-F687-4f45-9708-019B960494DF}">
-              <a14:hiddenLine xmlns="" xmlns:a14="http://schemas.microsoft.com/office/drawing/2010/main" w="9525">
+              <a14:hiddenLine xmlns:a14="http://schemas.microsoft.com/office/drawing/2010/main" xmlns="" w="9525">
                 <a:solidFill>
                   <a:srgbClr val="000000"/>
                 </a:solidFill>
@@ -1838,17 +1838,17 @@
           <a:ln/>
           <a:extLst>
             <a:ext uri="{FAA26D3D-D897-4be2-8F04-BA451C77F1D7}">
-              <ma14:placeholderFlag xmlns:ma14="http://schemas.microsoft.com/office/mac/drawingml/2011/main" xmlns="" val="1"/>
+              <ma14:placeholderFlag xmlns="" xmlns:ma14="http://schemas.microsoft.com/office/mac/drawingml/2011/main" val="1"/>
             </a:ext>
             <a:ext uri="{909E8E84-426E-40dd-AFC4-6F175D3DCCD1}">
-              <a14:hiddenFill xmlns="" xmlns:a14="http://schemas.microsoft.com/office/drawing/2010/main">
+              <a14:hiddenFill xmlns:a14="http://schemas.microsoft.com/office/drawing/2010/main" xmlns="">
                 <a:solidFill>
                   <a:srgbClr val="FFFFFF"/>
                 </a:solidFill>
               </a14:hiddenFill>
             </a:ext>
             <a:ext uri="{91240B29-F687-4f45-9708-019B960494DF}">
-              <a14:hiddenLine xmlns="" xmlns:a14="http://schemas.microsoft.com/office/drawing/2010/main" w="9525">
+              <a14:hiddenLine xmlns:a14="http://schemas.microsoft.com/office/drawing/2010/main" xmlns="" w="9525">
                 <a:solidFill>
                   <a:srgbClr val="000000"/>
                 </a:solidFill>
@@ -11158,7 +11158,7 @@
             </a:pPr>
             <a:fld id="{7323C85F-1269-B54F-84D5-B0E2FBC7E66E}" type="datetime1">
               <a:rPr lang="en-US" smtClean="0"/>
-              <a:t>7/28/2022</a:t>
+              <a:t>9/7/2022</a:t>
             </a:fld>
             <a:endParaRPr lang="en-US" dirty="0"/>
           </a:p>
@@ -12567,7 +12567,7 @@
             </a:pPr>
             <a:fld id="{7323C85F-1269-B54F-84D5-B0E2FBC7E66E}" type="datetime1">
               <a:rPr lang="en-US" smtClean="0"/>
-              <a:t>7/28/2022</a:t>
+              <a:t>9/7/2022</a:t>
             </a:fld>
             <a:endParaRPr lang="en-US" dirty="0"/>
           </a:p>
@@ -13489,7 +13489,7 @@
             </a:pPr>
             <a:fld id="{7323C85F-1269-B54F-84D5-B0E2FBC7E66E}" type="datetime1">
               <a:rPr lang="en-US" smtClean="0"/>
-              <a:t>7/28/2022</a:t>
+              <a:t>9/7/2022</a:t>
             </a:fld>
             <a:endParaRPr lang="en-US" dirty="0"/>
           </a:p>
@@ -14520,7 +14520,7 @@
             </a:pPr>
             <a:fld id="{7323C85F-1269-B54F-84D5-B0E2FBC7E66E}" type="datetime1">
               <a:rPr lang="en-US" smtClean="0"/>
-              <a:t>7/28/2022</a:t>
+              <a:t>9/7/2022</a:t>
             </a:fld>
             <a:endParaRPr lang="en-US" dirty="0"/>
           </a:p>
@@ -15551,7 +15551,7 @@
             </a:pPr>
             <a:fld id="{7323C85F-1269-B54F-84D5-B0E2FBC7E66E}" type="datetime1">
               <a:rPr lang="en-US" smtClean="0"/>
-              <a:t>7/28/2022</a:t>
+              <a:t>9/7/2022</a:t>
             </a:fld>
             <a:endParaRPr lang="en-US" dirty="0"/>
           </a:p>
@@ -16630,7 +16630,7 @@
             </a:pPr>
             <a:fld id="{7323C85F-1269-B54F-84D5-B0E2FBC7E66E}" type="datetime1">
               <a:rPr lang="en-US" smtClean="0"/>
-              <a:t>7/28/2022</a:t>
+              <a:t>9/7/2022</a:t>
             </a:fld>
             <a:endParaRPr lang="en-US" dirty="0"/>
           </a:p>
@@ -17707,7 +17707,7 @@
             </a:pPr>
             <a:fld id="{7323C85F-1269-B54F-84D5-B0E2FBC7E66E}" type="datetime1">
               <a:rPr lang="en-US" smtClean="0"/>
-              <a:t>7/28/2022</a:t>
+              <a:t>9/7/2022</a:t>
             </a:fld>
             <a:endParaRPr lang="en-US" dirty="0"/>
           </a:p>
@@ -18659,7 +18659,7 @@
             </a:pPr>
             <a:fld id="{7323C85F-1269-B54F-84D5-B0E2FBC7E66E}" type="datetime1">
               <a:rPr lang="en-US" smtClean="0"/>
-              <a:t>7/28/2022</a:t>
+              <a:t>9/7/2022</a:t>
             </a:fld>
             <a:endParaRPr lang="en-US" dirty="0"/>
           </a:p>
@@ -19424,7 +19424,7 @@
             </a:pPr>
             <a:fld id="{7323C85F-1269-B54F-84D5-B0E2FBC7E66E}" type="datetime1">
               <a:rPr lang="en-US" smtClean="0"/>
-              <a:t>7/28/2022</a:t>
+              <a:t>9/7/2022</a:t>
             </a:fld>
             <a:endParaRPr lang="en-US" dirty="0"/>
           </a:p>
@@ -20400,7 +20400,7 @@
             </a:pPr>
             <a:fld id="{7323C85F-1269-B54F-84D5-B0E2FBC7E66E}" type="datetime1">
               <a:rPr lang="en-US" smtClean="0"/>
-              <a:t>7/28/2022</a:t>
+              <a:t>9/7/2022</a:t>
             </a:fld>
             <a:endParaRPr lang="en-US" dirty="0"/>
           </a:p>
@@ -21692,6 +21692,67 @@
           </a:p>
         </p:txBody>
       </p:sp>
+      <p:sp>
+        <p:nvSpPr>
+          <p:cNvPr id="3" name="Rectangle 2">
+            <a:extLst>
+              <a:ext uri="{FF2B5EF4-FFF2-40B4-BE49-F238E27FC236}">
+                <a16:creationId xmlns:a16="http://schemas.microsoft.com/office/drawing/2014/main" id="{A53974DD-DF98-EF82-F77A-9D9FA7FA6393}"/>
+              </a:ext>
+            </a:extLst>
+          </p:cNvPr>
+          <p:cNvSpPr/>
+          <p:nvPr/>
+        </p:nvSpPr>
+        <p:spPr>
+          <a:xfrm>
+            <a:off x="3371949" y="0"/>
+            <a:ext cx="5772051" cy="276999"/>
+          </a:xfrm>
+          <a:prstGeom prst="rect">
+            <a:avLst/>
+          </a:prstGeom>
+        </p:spPr>
+        <p:txBody>
+          <a:bodyPr wrap="square">
+            <a:spAutoFit/>
+          </a:bodyPr>
+          <a:lstStyle/>
+          <a:p>
+            <a:pPr marL="0" marR="0" lvl="0" indent="0" defTabSz="914400" eaLnBrk="1" fontAlgn="auto" latinLnBrk="0" hangingPunct="1">
+              <a:lnSpc>
+                <a:spcPct val="100000"/>
+              </a:lnSpc>
+              <a:spcBef>
+                <a:spcPts val="0"/>
+              </a:spcBef>
+              <a:spcAft>
+                <a:spcPts val="0"/>
+              </a:spcAft>
+              <a:buClrTx/>
+              <a:buSzTx/>
+              <a:buFontTx/>
+              <a:buNone/>
+              <a:tabLst/>
+              <a:defRPr/>
+            </a:pPr>
+            <a:r>
+              <a:rPr kumimoji="0" lang="en-US" sz="1200" b="0" i="1" u="none" strike="noStrike" kern="0" cap="none" spc="0" normalizeH="0" baseline="0" noProof="0" dirty="0">
+                <a:ln>
+                  <a:noFill/>
+                </a:ln>
+                <a:solidFill>
+                  <a:srgbClr val="FF4434"/>
+                </a:solidFill>
+                <a:effectLst/>
+                <a:uLnTx/>
+                <a:uFillTx/>
+              </a:rPr>
+              <a:t>This work is supported by the National Science Foundation under Award 2021287 </a:t>
+            </a:r>
+          </a:p>
+        </p:txBody>
+      </p:sp>
     </p:spTree>
     <p:extLst>
       <p:ext uri="{BB962C8B-B14F-4D97-AF65-F5344CB8AC3E}">
@@ -25088,8 +25149,8 @@
           </mc:Fallback>
         </mc:AlternateContent>
       </p:grpSp>
-      <mc:AlternateContent xmlns:mc="http://schemas.openxmlformats.org/markup-compatibility/2006">
-        <mc:Choice xmlns:p14="http://schemas.microsoft.com/office/powerpoint/2010/main" Requires="p14">
+      <mc:AlternateContent xmlns:mc="http://schemas.openxmlformats.org/markup-compatibility/2006" xmlns:p14="http://schemas.microsoft.com/office/powerpoint/2010/main">
+        <mc:Choice Requires="p14">
           <p:contentPart p14:bwMode="auto" r:id="rId12">
             <p14:nvContentPartPr>
               <p14:cNvPr id="9" name="Ink 8">
@@ -25108,7 +25169,7 @@
             </p14:xfrm>
           </p:contentPart>
         </mc:Choice>
-        <mc:Fallback>
+        <mc:Fallback xmlns="">
           <p:pic>
             <p:nvPicPr>
               <p:cNvPr id="9" name="Ink 8">
@@ -25139,8 +25200,8 @@
           </p:pic>
         </mc:Fallback>
       </mc:AlternateContent>
-      <mc:AlternateContent xmlns:mc="http://schemas.openxmlformats.org/markup-compatibility/2006">
-        <mc:Choice xmlns:p14="http://schemas.microsoft.com/office/powerpoint/2010/main" Requires="p14">
+      <mc:AlternateContent xmlns:mc="http://schemas.openxmlformats.org/markup-compatibility/2006" xmlns:p14="http://schemas.microsoft.com/office/powerpoint/2010/main">
+        <mc:Choice Requires="p14">
           <p:contentPart p14:bwMode="auto" r:id="rId14">
             <p14:nvContentPartPr>
               <p14:cNvPr id="10" name="Ink 9">
@@ -25159,7 +25220,7 @@
             </p14:xfrm>
           </p:contentPart>
         </mc:Choice>
-        <mc:Fallback>
+        <mc:Fallback xmlns="">
           <p:pic>
             <p:nvPicPr>
               <p:cNvPr id="10" name="Ink 9">
@@ -25364,8 +25425,8 @@
           </mc:Fallback>
         </mc:AlternateContent>
       </p:grpSp>
-      <mc:AlternateContent xmlns:mc="http://schemas.openxmlformats.org/markup-compatibility/2006">
-        <mc:Choice xmlns:p14="http://schemas.microsoft.com/office/powerpoint/2010/main" Requires="p14">
+      <mc:AlternateContent xmlns:mc="http://schemas.openxmlformats.org/markup-compatibility/2006" xmlns:p14="http://schemas.microsoft.com/office/powerpoint/2010/main">
+        <mc:Choice Requires="p14">
           <p:contentPart p14:bwMode="auto" r:id="rId22">
             <p14:nvContentPartPr>
               <p14:cNvPr id="18" name="Ink 17">
@@ -25384,7 +25445,7 @@
             </p14:xfrm>
           </p:contentPart>
         </mc:Choice>
-        <mc:Fallback>
+        <mc:Fallback xmlns="">
           <p:pic>
             <p:nvPicPr>
               <p:cNvPr id="18" name="Ink 17">

</xml_diff>